<commit_message>
Minor corrections to the format.
</commit_message>
<xml_diff>
--- a/ImageAnalysisPipeline7.pptx
+++ b/ImageAnalysisPipeline7.pptx
@@ -229,7 +229,7 @@
           <a:p>
             <a:fld id="{FC708371-2EE1-4AD5-8AAD-1B917E870976}" type="datetimeFigureOut">
               <a:rPr lang="en-US" smtClean="0"/>
-              <a:t>10/24/2022</a:t>
+              <a:t>10/25/2022</a:t>
             </a:fld>
             <a:endParaRPr lang="en-US"/>
           </a:p>
@@ -795,7 +795,7 @@
           <a:p>
             <a:fld id="{6B46607B-1A35-499A-9B28-C398566005CC}" type="datetimeFigureOut">
               <a:rPr lang="en-US" smtClean="0"/>
-              <a:t>10/24/2022</a:t>
+              <a:t>10/25/2022</a:t>
             </a:fld>
             <a:endParaRPr lang="en-US"/>
           </a:p>
@@ -965,7 +965,7 @@
           <a:p>
             <a:fld id="{6B46607B-1A35-499A-9B28-C398566005CC}" type="datetimeFigureOut">
               <a:rPr lang="en-US" smtClean="0"/>
-              <a:t>10/24/2022</a:t>
+              <a:t>10/25/2022</a:t>
             </a:fld>
             <a:endParaRPr lang="en-US"/>
           </a:p>
@@ -1145,7 +1145,7 @@
           <a:p>
             <a:fld id="{6B46607B-1A35-499A-9B28-C398566005CC}" type="datetimeFigureOut">
               <a:rPr lang="en-US" smtClean="0"/>
-              <a:t>10/24/2022</a:t>
+              <a:t>10/25/2022</a:t>
             </a:fld>
             <a:endParaRPr lang="en-US"/>
           </a:p>
@@ -1315,7 +1315,7 @@
           <a:p>
             <a:fld id="{6B46607B-1A35-499A-9B28-C398566005CC}" type="datetimeFigureOut">
               <a:rPr lang="en-US" smtClean="0"/>
-              <a:t>10/24/2022</a:t>
+              <a:t>10/25/2022</a:t>
             </a:fld>
             <a:endParaRPr lang="en-US"/>
           </a:p>
@@ -1559,7 +1559,7 @@
           <a:p>
             <a:fld id="{6B46607B-1A35-499A-9B28-C398566005CC}" type="datetimeFigureOut">
               <a:rPr lang="en-US" smtClean="0"/>
-              <a:t>10/24/2022</a:t>
+              <a:t>10/25/2022</a:t>
             </a:fld>
             <a:endParaRPr lang="en-US"/>
           </a:p>
@@ -1791,7 +1791,7 @@
           <a:p>
             <a:fld id="{6B46607B-1A35-499A-9B28-C398566005CC}" type="datetimeFigureOut">
               <a:rPr lang="en-US" smtClean="0"/>
-              <a:t>10/24/2022</a:t>
+              <a:t>10/25/2022</a:t>
             </a:fld>
             <a:endParaRPr lang="en-US"/>
           </a:p>
@@ -2158,7 +2158,7 @@
           <a:p>
             <a:fld id="{6B46607B-1A35-499A-9B28-C398566005CC}" type="datetimeFigureOut">
               <a:rPr lang="en-US" smtClean="0"/>
-              <a:t>10/24/2022</a:t>
+              <a:t>10/25/2022</a:t>
             </a:fld>
             <a:endParaRPr lang="en-US"/>
           </a:p>
@@ -2276,7 +2276,7 @@
           <a:p>
             <a:fld id="{6B46607B-1A35-499A-9B28-C398566005CC}" type="datetimeFigureOut">
               <a:rPr lang="en-US" smtClean="0"/>
-              <a:t>10/24/2022</a:t>
+              <a:t>10/25/2022</a:t>
             </a:fld>
             <a:endParaRPr lang="en-US"/>
           </a:p>
@@ -2371,7 +2371,7 @@
           <a:p>
             <a:fld id="{6B46607B-1A35-499A-9B28-C398566005CC}" type="datetimeFigureOut">
               <a:rPr lang="en-US" smtClean="0"/>
-              <a:t>10/24/2022</a:t>
+              <a:t>10/25/2022</a:t>
             </a:fld>
             <a:endParaRPr lang="en-US"/>
           </a:p>
@@ -2648,7 +2648,7 @@
           <a:p>
             <a:fld id="{6B46607B-1A35-499A-9B28-C398566005CC}" type="datetimeFigureOut">
               <a:rPr lang="en-US" smtClean="0"/>
-              <a:t>10/24/2022</a:t>
+              <a:t>10/25/2022</a:t>
             </a:fld>
             <a:endParaRPr lang="en-US"/>
           </a:p>
@@ -2905,7 +2905,7 @@
           <a:p>
             <a:fld id="{6B46607B-1A35-499A-9B28-C398566005CC}" type="datetimeFigureOut">
               <a:rPr lang="en-US" smtClean="0"/>
-              <a:t>10/24/2022</a:t>
+              <a:t>10/25/2022</a:t>
             </a:fld>
             <a:endParaRPr lang="en-US"/>
           </a:p>
@@ -3118,7 +3118,7 @@
           <a:p>
             <a:fld id="{6B46607B-1A35-499A-9B28-C398566005CC}" type="datetimeFigureOut">
               <a:rPr lang="en-US" smtClean="0"/>
-              <a:t>10/24/2022</a:t>
+              <a:t>10/25/2022</a:t>
             </a:fld>
             <a:endParaRPr lang="en-US"/>
           </a:p>
@@ -6242,7 +6242,7 @@
         </p:nvCxnSpPr>
         <p:spPr>
           <a:xfrm>
-            <a:off x="3436435" y="3879228"/>
+            <a:off x="3436435" y="3881949"/>
             <a:ext cx="914840" cy="0"/>
           </a:xfrm>
           <a:prstGeom prst="line">
@@ -6281,13 +6281,12 @@
           </p:cNvPr>
           <p:cNvCxnSpPr>
             <a:cxnSpLocks/>
-            <a:endCxn id="74" idx="0"/>
           </p:cNvCxnSpPr>
           <p:nvPr/>
         </p:nvCxnSpPr>
         <p:spPr>
           <a:xfrm>
-            <a:off x="4351276" y="3879305"/>
+            <a:off x="4348555" y="3879305"/>
             <a:ext cx="0" cy="173653"/>
           </a:xfrm>
           <a:prstGeom prst="line">
@@ -6418,13 +6417,14 @@
           </p:cNvPr>
           <p:cNvCxnSpPr>
             <a:cxnSpLocks/>
+            <a:endCxn id="78" idx="0"/>
           </p:cNvCxnSpPr>
           <p:nvPr/>
         </p:nvCxnSpPr>
         <p:spPr>
-          <a:xfrm flipH="1">
-            <a:off x="2505456" y="3879305"/>
-            <a:ext cx="7573" cy="173653"/>
+          <a:xfrm>
+            <a:off x="2510028" y="3875314"/>
+            <a:ext cx="0" cy="177644"/>
           </a:xfrm>
           <a:prstGeom prst="line">
             <a:avLst/>

</xml_diff>